<commit_message>
PPT updated with image
</commit_message>
<xml_diff>
--- a/Course Day 9/Webmonk Course (day - 9).pptx
+++ b/Course Day 9/Webmonk Course (day - 9).pptx
@@ -12,14 +12,15 @@
     <p:sldId id="256" r:id="rId6"/>
     <p:sldId id="257" r:id="rId7"/>
     <p:sldId id="258" r:id="rId8"/>
+    <p:sldId id="259" r:id="rId9"/>
   </p:sldIdLst>
   <p:sldSz cy="6858000" cx="12192000"/>
   <p:notesSz cx="6858000" cy="9144000"/>
   <p:embeddedFontLst>
     <p:embeddedFont>
       <p:font typeface="Gill Sans"/>
-      <p:regular r:id="rId9"/>
-      <p:bold r:id="rId10"/>
+      <p:regular r:id="rId10"/>
+      <p:bold r:id="rId11"/>
     </p:embeddedFont>
   </p:embeddedFontLst>
   <p:defaultTextStyle>
@@ -253,7 +254,7 @@
   </p:defaultTextStyle>
   <p:extLst>
     <p:ext uri="http://customooxmlschemas.google.com/">
-      <go:slidesCustomData xmlns:go="http://customooxmlschemas.google.com/" r:id="rId11" roundtripDataSignature="AMtx7miRpMx8Q5aMQkAb4H62zoucpOm4hA=="/>
+      <go:slidesCustomData xmlns:go="http://customooxmlschemas.google.com/" r:id="rId12" roundtripDataSignature="AMtx7miJQBTezI2ZYTA0296C42T/5692Pw=="/>
     </p:ext>
   </p:extLst>
 </p:presentation>
@@ -2029,6 +2030,150 @@
             <a:tailEnd len="sm" w="sm" type="none"/>
           </a:ln>
         </p:spPr>
+      </p:sp>
+    </p:spTree>
+  </p:cSld>
+  <p:clrMapOvr>
+    <a:masterClrMapping/>
+  </p:clrMapOvr>
+</p:notes>
+</file>
+
+<file path=ppt/notesSlides/notesSlide4.xml><?xml version="1.0" encoding="utf-8"?>
+<p:notes xmlns:a="http://schemas.openxmlformats.org/drawingml/2006/main" xmlns:r="http://schemas.openxmlformats.org/officeDocument/2006/relationships" xmlns:mc="http://schemas.openxmlformats.org/markup-compatibility/2006" xmlns:mv="urn:schemas-microsoft-com:mac:vml" xmlns:p="http://schemas.openxmlformats.org/presentationml/2006/main" xmlns:c="http://schemas.openxmlformats.org/drawingml/2006/chart" xmlns:dgm="http://schemas.openxmlformats.org/drawingml/2006/diagram" xmlns:o="urn:schemas-microsoft-com:office:office" xmlns:v="urn:schemas-microsoft-com:vml" xmlns:pvml="urn:schemas-microsoft-com:office:powerpoint" xmlns:com="http://schemas.openxmlformats.org/drawingml/2006/compatibility" xmlns:p14="http://schemas.microsoft.com/office/powerpoint/2010/main" xmlns:p15="http://schemas.microsoft.com/office/powerpoint/2012/main" xmlns:ahyp="http://schemas.microsoft.com/office/drawing/2018/hyperlinkcolor" showMasterPhAnim="0" showMasterSp="0">
+  <p:cSld>
+    <p:spTree>
+      <p:nvGrpSpPr>
+        <p:cNvPr id="124" name="Shape 124"/>
+        <p:cNvGrpSpPr/>
+        <p:nvPr/>
+      </p:nvGrpSpPr>
+      <p:grpSpPr>
+        <a:xfrm>
+          <a:off x="0" y="0"/>
+          <a:ext cx="0" cy="0"/>
+          <a:chOff x="0" y="0"/>
+          <a:chExt cx="0" cy="0"/>
+        </a:xfrm>
+      </p:grpSpPr>
+      <p:sp>
+        <p:nvSpPr>
+          <p:cNvPr id="125" name="Google Shape;125;ge10f06e2a2_0_0:notes"/>
+          <p:cNvSpPr/>
+          <p:nvPr>
+            <p:ph idx="2" type="sldImg"/>
+          </p:nvPr>
+        </p:nvSpPr>
+        <p:spPr>
+          <a:xfrm>
+            <a:off x="685800" y="1143000"/>
+            <a:ext cx="5486400" cy="3086100"/>
+          </a:xfrm>
+          <a:custGeom>
+            <a:rect b="b" l="l" r="r" t="t"/>
+            <a:pathLst>
+              <a:path extrusionOk="0" h="120000" w="120000">
+                <a:moveTo>
+                  <a:pt x="0" y="0"/>
+                </a:moveTo>
+                <a:lnTo>
+                  <a:pt x="120000" y="0"/>
+                </a:lnTo>
+                <a:lnTo>
+                  <a:pt x="120000" y="120000"/>
+                </a:lnTo>
+                <a:lnTo>
+                  <a:pt x="0" y="120000"/>
+                </a:lnTo>
+                <a:close/>
+              </a:path>
+            </a:pathLst>
+          </a:custGeom>
+        </p:spPr>
+      </p:sp>
+      <p:sp>
+        <p:nvSpPr>
+          <p:cNvPr id="126" name="Google Shape;126;ge10f06e2a2_0_0:notes"/>
+          <p:cNvSpPr txBox="1"/>
+          <p:nvPr>
+            <p:ph idx="1" type="body"/>
+          </p:nvPr>
+        </p:nvSpPr>
+        <p:spPr>
+          <a:xfrm>
+            <a:off x="685800" y="4400550"/>
+            <a:ext cx="5486400" cy="3600600"/>
+          </a:xfrm>
+          <a:prstGeom prst="rect">
+            <a:avLst/>
+          </a:prstGeom>
+        </p:spPr>
+        <p:txBody>
+          <a:bodyPr anchorCtr="0" anchor="t" bIns="45700" lIns="91425" spcFirstLastPara="1" rIns="91425" wrap="square" tIns="45700">
+            <a:noAutofit/>
+          </a:bodyPr>
+          <a:lstStyle/>
+          <a:p>
+            <a:pPr indent="0" lvl="0" marL="0" rtl="0" algn="l">
+              <a:spcBef>
+                <a:spcPts val="0"/>
+              </a:spcBef>
+              <a:spcAft>
+                <a:spcPts val="0"/>
+              </a:spcAft>
+              <a:buNone/>
+            </a:pPr>
+            <a:r>
+              <a:t/>
+            </a:r>
+            <a:endParaRPr/>
+          </a:p>
+        </p:txBody>
+      </p:sp>
+      <p:sp>
+        <p:nvSpPr>
+          <p:cNvPr id="127" name="Google Shape;127;ge10f06e2a2_0_0:notes"/>
+          <p:cNvSpPr txBox="1"/>
+          <p:nvPr>
+            <p:ph idx="12" type="sldNum"/>
+          </p:nvPr>
+        </p:nvSpPr>
+        <p:spPr>
+          <a:xfrm>
+            <a:off x="3884613" y="8685213"/>
+            <a:ext cx="2971800" cy="458700"/>
+          </a:xfrm>
+          <a:prstGeom prst="rect">
+            <a:avLst/>
+          </a:prstGeom>
+        </p:spPr>
+        <p:txBody>
+          <a:bodyPr anchorCtr="0" anchor="b" bIns="45700" lIns="91425" spcFirstLastPara="1" rIns="91425" wrap="square" tIns="45700">
+            <a:noAutofit/>
+          </a:bodyPr>
+          <a:lstStyle/>
+          <a:p>
+            <a:pPr indent="0" lvl="0" marL="0" rtl="0" algn="r">
+              <a:spcBef>
+                <a:spcPts val="0"/>
+              </a:spcBef>
+              <a:spcAft>
+                <a:spcPts val="0"/>
+              </a:spcAft>
+              <a:buClr>
+                <a:srgbClr val="000000"/>
+              </a:buClr>
+              <a:buSzPts val="1200"/>
+              <a:buFont typeface="Arial"/>
+              <a:buNone/>
+            </a:pPr>
+            <a:fld id="{00000000-1234-1234-1234-123412341234}" type="slidenum">
+              <a:rPr lang="en-IN"/>
+              <a:t>‹#›</a:t>
+            </a:fld>
+            <a:endParaRPr/>
+          </a:p>
+        </p:txBody>
       </p:sp>
     </p:spTree>
   </p:cSld>
@@ -19963,10 +20108,103 @@
 </p:sld>
 </file>
 
+<file path=ppt/slides/slide4.xml><?xml version="1.0" encoding="utf-8"?>
+<p:sld xmlns:a="http://schemas.openxmlformats.org/drawingml/2006/main" xmlns:r="http://schemas.openxmlformats.org/officeDocument/2006/relationships" xmlns:mc="http://schemas.openxmlformats.org/markup-compatibility/2006" xmlns:mv="urn:schemas-microsoft-com:mac:vml" xmlns:p="http://schemas.openxmlformats.org/presentationml/2006/main" xmlns:c="http://schemas.openxmlformats.org/drawingml/2006/chart" xmlns:dgm="http://schemas.openxmlformats.org/drawingml/2006/diagram" xmlns:o="urn:schemas-microsoft-com:office:office" xmlns:v="urn:schemas-microsoft-com:vml" xmlns:pvml="urn:schemas-microsoft-com:office:powerpoint" xmlns:com="http://schemas.openxmlformats.org/drawingml/2006/compatibility" xmlns:p14="http://schemas.microsoft.com/office/powerpoint/2010/main" xmlns:p15="http://schemas.microsoft.com/office/powerpoint/2012/main" xmlns:ahyp="http://schemas.microsoft.com/office/drawing/2018/hyperlinkcolor">
+  <p:cSld>
+    <p:spTree>
+      <p:nvGrpSpPr>
+        <p:cNvPr id="128" name="Shape 128"/>
+        <p:cNvGrpSpPr/>
+        <p:nvPr/>
+      </p:nvGrpSpPr>
+      <p:grpSpPr>
+        <a:xfrm>
+          <a:off x="0" y="0"/>
+          <a:ext cx="0" cy="0"/>
+          <a:chOff x="0" y="0"/>
+          <a:chExt cx="0" cy="0"/>
+        </a:xfrm>
+      </p:grpSpPr>
+      <p:sp>
+        <p:nvSpPr>
+          <p:cNvPr id="129" name="Google Shape;129;ge10f06e2a2_0_0"/>
+          <p:cNvSpPr txBox="1"/>
+          <p:nvPr>
+            <p:ph type="title"/>
+          </p:nvPr>
+        </p:nvSpPr>
+        <p:spPr>
+          <a:xfrm>
+            <a:off x="2231136" y="964692"/>
+            <a:ext cx="7729800" cy="1188600"/>
+          </a:xfrm>
+          <a:prstGeom prst="rect">
+            <a:avLst/>
+          </a:prstGeom>
+        </p:spPr>
+        <p:txBody>
+          <a:bodyPr anchorCtr="0" anchor="ctr" bIns="182875" lIns="182875" spcFirstLastPara="1" rIns="182875" wrap="square" tIns="182875">
+            <a:noAutofit/>
+          </a:bodyPr>
+          <a:lstStyle/>
+          <a:p>
+            <a:pPr indent="0" lvl="0" marL="0" rtl="0" algn="ctr">
+              <a:spcBef>
+                <a:spcPts val="0"/>
+              </a:spcBef>
+              <a:spcAft>
+                <a:spcPts val="0"/>
+              </a:spcAft>
+              <a:buNone/>
+            </a:pPr>
+            <a:r>
+              <a:rPr lang="en-IN"/>
+              <a:t>HOW IT LOOKS LIKE?</a:t>
+            </a:r>
+            <a:endParaRPr/>
+          </a:p>
+        </p:txBody>
+      </p:sp>
+      <p:pic>
+        <p:nvPicPr>
+          <p:cNvPr id="130" name="Google Shape;130;ge10f06e2a2_0_0"/>
+          <p:cNvPicPr preferRelativeResize="0"/>
+          <p:nvPr/>
+        </p:nvPicPr>
+        <p:blipFill>
+          <a:blip r:embed="rId3">
+            <a:alphaModFix/>
+          </a:blip>
+          <a:stretch>
+            <a:fillRect/>
+          </a:stretch>
+        </p:blipFill>
+        <p:spPr>
+          <a:xfrm>
+            <a:off x="1883787" y="2528100"/>
+            <a:ext cx="8424474" cy="3879049"/>
+          </a:xfrm>
+          <a:prstGeom prst="rect">
+            <a:avLst/>
+          </a:prstGeom>
+          <a:noFill/>
+          <a:ln>
+            <a:noFill/>
+          </a:ln>
+        </p:spPr>
+      </p:pic>
+    </p:spTree>
+  </p:cSld>
+  <p:clrMapOvr>
+    <a:masterClrMapping/>
+  </p:clrMapOvr>
+</p:sld>
+</file>
+
 <file path=ppt/theme/theme1.xml><?xml version="1.0" encoding="utf-8"?>
-<a:theme xmlns:a="http://schemas.openxmlformats.org/drawingml/2006/main" xmlns:r="http://schemas.openxmlformats.org/officeDocument/2006/relationships" name="Office Theme">
+<a:theme xmlns:a="http://schemas.openxmlformats.org/drawingml/2006/main" xmlns:r="http://schemas.openxmlformats.org/officeDocument/2006/relationships" name="Parcel">
   <a:themeElements>
-    <a:clrScheme name="Office">
+    <a:clrScheme name="Parcel">
       <a:dk1>
         <a:srgbClr val="000000"/>
       </a:dk1>
@@ -19974,34 +20212,34 @@
         <a:srgbClr val="FFFFFF"/>
       </a:lt1>
       <a:dk2>
-        <a:srgbClr val="44546A"/>
+        <a:srgbClr val="5E5E5E"/>
       </a:dk2>
       <a:lt2>
-        <a:srgbClr val="E7E6E6"/>
+        <a:srgbClr val="DDDDDD"/>
       </a:lt2>
       <a:accent1>
-        <a:srgbClr val="4472C4"/>
+        <a:srgbClr val="A6B727"/>
       </a:accent1>
       <a:accent2>
-        <a:srgbClr val="ED7D31"/>
+        <a:srgbClr val="418AB3"/>
       </a:accent2>
       <a:accent3>
-        <a:srgbClr val="A5A5A5"/>
+        <a:srgbClr val="F69200"/>
       </a:accent3>
       <a:accent4>
-        <a:srgbClr val="FFC000"/>
+        <a:srgbClr val="838383"/>
       </a:accent4>
       <a:accent5>
-        <a:srgbClr val="5B9BD5"/>
+        <a:srgbClr val="FEC306"/>
       </a:accent5>
       <a:accent6>
-        <a:srgbClr val="70AD47"/>
+        <a:srgbClr val="DF5327"/>
       </a:accent6>
       <a:hlink>
-        <a:srgbClr val="0563C1"/>
+        <a:srgbClr val="F59E00"/>
       </a:hlink>
       <a:folHlink>
-        <a:srgbClr val="954F72"/>
+        <a:srgbClr val="B2B2B2"/>
       </a:folHlink>
     </a:clrScheme>
     <a:fontScheme name="Office">
@@ -20243,9 +20481,9 @@
 </file>
 
 <file path=ppt/theme/theme2.xml><?xml version="1.0" encoding="utf-8"?>
-<a:theme xmlns:a="http://schemas.openxmlformats.org/drawingml/2006/main" xmlns:r="http://schemas.openxmlformats.org/officeDocument/2006/relationships" name="Parcel">
+<a:theme xmlns:a="http://schemas.openxmlformats.org/drawingml/2006/main" xmlns:r="http://schemas.openxmlformats.org/officeDocument/2006/relationships" name="Office Theme">
   <a:themeElements>
-    <a:clrScheme name="Parcel">
+    <a:clrScheme name="Office">
       <a:dk1>
         <a:srgbClr val="000000"/>
       </a:dk1>
@@ -20253,34 +20491,34 @@
         <a:srgbClr val="FFFFFF"/>
       </a:lt1>
       <a:dk2>
-        <a:srgbClr val="5E5E5E"/>
+        <a:srgbClr val="44546A"/>
       </a:dk2>
       <a:lt2>
-        <a:srgbClr val="DDDDDD"/>
+        <a:srgbClr val="E7E6E6"/>
       </a:lt2>
       <a:accent1>
-        <a:srgbClr val="A6B727"/>
+        <a:srgbClr val="4472C4"/>
       </a:accent1>
       <a:accent2>
-        <a:srgbClr val="418AB3"/>
+        <a:srgbClr val="ED7D31"/>
       </a:accent2>
       <a:accent3>
-        <a:srgbClr val="F69200"/>
+        <a:srgbClr val="A5A5A5"/>
       </a:accent3>
       <a:accent4>
-        <a:srgbClr val="838383"/>
+        <a:srgbClr val="FFC000"/>
       </a:accent4>
       <a:accent5>
-        <a:srgbClr val="FEC306"/>
+        <a:srgbClr val="5B9BD5"/>
       </a:accent5>
       <a:accent6>
-        <a:srgbClr val="DF5327"/>
+        <a:srgbClr val="70AD47"/>
       </a:accent6>
       <a:hlink>
-        <a:srgbClr val="F59E00"/>
+        <a:srgbClr val="0563C1"/>
       </a:hlink>
       <a:folHlink>
-        <a:srgbClr val="B2B2B2"/>
+        <a:srgbClr val="954F72"/>
       </a:folHlink>
     </a:clrScheme>
     <a:fontScheme name="Office">

</xml_diff>